<commit_message>
Update in presentation for M2.2 git Merge
</commit_message>
<xml_diff>
--- a/M2/Skill/2-Merge/2-merge.pptx
+++ b/M2/Skill/2-Merge/2-merge.pptx
@@ -12,9 +12,10 @@
     <p:sldId id="259" r:id="rId6"/>
     <p:sldId id="260" r:id="rId7"/>
     <p:sldId id="261" r:id="rId8"/>
-    <p:sldId id="262" r:id="rId9"/>
-    <p:sldId id="263" r:id="rId10"/>
-    <p:sldId id="264" r:id="rId11"/>
+    <p:sldId id="266" r:id="rId9"/>
+    <p:sldId id="262" r:id="rId10"/>
+    <p:sldId id="263" r:id="rId11"/>
+    <p:sldId id="264" r:id="rId12"/>
   </p:sldIdLst>
   <p:sldSz cx="12192000" cy="6858000"/>
   <p:notesSz cx="6858000" cy="9144000"/>
@@ -270,7 +271,7 @@
           <a:p>
             <a:fld id="{D63A4122-3B30-4490-8BBB-F5C76D08DB6E}" type="datetimeFigureOut">
               <a:rPr lang="nl-NL" smtClean="0"/>
-              <a:t>21-11-2024</a:t>
+              <a:t>25-11-2024</a:t>
             </a:fld>
             <a:endParaRPr lang="nl-NL"/>
           </a:p>
@@ -324,7 +325,7 @@
           <a:p>
             <a:fld id="{C725739E-65A5-4D3F-B2DB-1C9379069975}" type="slidenum">
               <a:rPr lang="nl-NL" smtClean="0"/>
-              <a:t>‹nr.›</a:t>
+              <a:t>‹#›</a:t>
             </a:fld>
             <a:endParaRPr lang="nl-NL"/>
           </a:p>
@@ -470,7 +471,7 @@
           <a:p>
             <a:fld id="{D63A4122-3B30-4490-8BBB-F5C76D08DB6E}" type="datetimeFigureOut">
               <a:rPr lang="nl-NL" smtClean="0"/>
-              <a:t>21-11-2024</a:t>
+              <a:t>25-11-2024</a:t>
             </a:fld>
             <a:endParaRPr lang="nl-NL"/>
           </a:p>
@@ -524,7 +525,7 @@
           <a:p>
             <a:fld id="{C725739E-65A5-4D3F-B2DB-1C9379069975}" type="slidenum">
               <a:rPr lang="nl-NL" smtClean="0"/>
-              <a:t>‹nr.›</a:t>
+              <a:t>‹#›</a:t>
             </a:fld>
             <a:endParaRPr lang="nl-NL"/>
           </a:p>
@@ -680,7 +681,7 @@
           <a:p>
             <a:fld id="{D63A4122-3B30-4490-8BBB-F5C76D08DB6E}" type="datetimeFigureOut">
               <a:rPr lang="nl-NL" smtClean="0"/>
-              <a:t>21-11-2024</a:t>
+              <a:t>25-11-2024</a:t>
             </a:fld>
             <a:endParaRPr lang="nl-NL"/>
           </a:p>
@@ -734,7 +735,7 @@
           <a:p>
             <a:fld id="{C725739E-65A5-4D3F-B2DB-1C9379069975}" type="slidenum">
               <a:rPr lang="nl-NL" smtClean="0"/>
-              <a:t>‹nr.›</a:t>
+              <a:t>‹#›</a:t>
             </a:fld>
             <a:endParaRPr lang="nl-NL"/>
           </a:p>
@@ -880,7 +881,7 @@
           <a:p>
             <a:fld id="{D63A4122-3B30-4490-8BBB-F5C76D08DB6E}" type="datetimeFigureOut">
               <a:rPr lang="nl-NL" smtClean="0"/>
-              <a:t>21-11-2024</a:t>
+              <a:t>25-11-2024</a:t>
             </a:fld>
             <a:endParaRPr lang="nl-NL"/>
           </a:p>
@@ -934,7 +935,7 @@
           <a:p>
             <a:fld id="{C725739E-65A5-4D3F-B2DB-1C9379069975}" type="slidenum">
               <a:rPr lang="nl-NL" smtClean="0"/>
-              <a:t>‹nr.›</a:t>
+              <a:t>‹#›</a:t>
             </a:fld>
             <a:endParaRPr lang="nl-NL"/>
           </a:p>
@@ -1156,7 +1157,7 @@
           <a:p>
             <a:fld id="{D63A4122-3B30-4490-8BBB-F5C76D08DB6E}" type="datetimeFigureOut">
               <a:rPr lang="nl-NL" smtClean="0"/>
-              <a:t>21-11-2024</a:t>
+              <a:t>25-11-2024</a:t>
             </a:fld>
             <a:endParaRPr lang="nl-NL"/>
           </a:p>
@@ -1210,7 +1211,7 @@
           <a:p>
             <a:fld id="{C725739E-65A5-4D3F-B2DB-1C9379069975}" type="slidenum">
               <a:rPr lang="nl-NL" smtClean="0"/>
-              <a:t>‹nr.›</a:t>
+              <a:t>‹#›</a:t>
             </a:fld>
             <a:endParaRPr lang="nl-NL"/>
           </a:p>
@@ -1424,7 +1425,7 @@
           <a:p>
             <a:fld id="{D63A4122-3B30-4490-8BBB-F5C76D08DB6E}" type="datetimeFigureOut">
               <a:rPr lang="nl-NL" smtClean="0"/>
-              <a:t>21-11-2024</a:t>
+              <a:t>25-11-2024</a:t>
             </a:fld>
             <a:endParaRPr lang="nl-NL"/>
           </a:p>
@@ -1478,7 +1479,7 @@
           <a:p>
             <a:fld id="{C725739E-65A5-4D3F-B2DB-1C9379069975}" type="slidenum">
               <a:rPr lang="nl-NL" smtClean="0"/>
-              <a:t>‹nr.›</a:t>
+              <a:t>‹#›</a:t>
             </a:fld>
             <a:endParaRPr lang="nl-NL"/>
           </a:p>
@@ -1839,7 +1840,7 @@
           <a:p>
             <a:fld id="{D63A4122-3B30-4490-8BBB-F5C76D08DB6E}" type="datetimeFigureOut">
               <a:rPr lang="nl-NL" smtClean="0"/>
-              <a:t>21-11-2024</a:t>
+              <a:t>25-11-2024</a:t>
             </a:fld>
             <a:endParaRPr lang="nl-NL"/>
           </a:p>
@@ -1893,7 +1894,7 @@
           <a:p>
             <a:fld id="{C725739E-65A5-4D3F-B2DB-1C9379069975}" type="slidenum">
               <a:rPr lang="nl-NL" smtClean="0"/>
-              <a:t>‹nr.›</a:t>
+              <a:t>‹#›</a:t>
             </a:fld>
             <a:endParaRPr lang="nl-NL"/>
           </a:p>
@@ -1981,7 +1982,7 @@
           <a:p>
             <a:fld id="{D63A4122-3B30-4490-8BBB-F5C76D08DB6E}" type="datetimeFigureOut">
               <a:rPr lang="nl-NL" smtClean="0"/>
-              <a:t>21-11-2024</a:t>
+              <a:t>25-11-2024</a:t>
             </a:fld>
             <a:endParaRPr lang="nl-NL"/>
           </a:p>
@@ -2035,7 +2036,7 @@
           <a:p>
             <a:fld id="{C725739E-65A5-4D3F-B2DB-1C9379069975}" type="slidenum">
               <a:rPr lang="nl-NL" smtClean="0"/>
-              <a:t>‹nr.›</a:t>
+              <a:t>‹#›</a:t>
             </a:fld>
             <a:endParaRPr lang="nl-NL"/>
           </a:p>
@@ -2094,7 +2095,7 @@
           <a:p>
             <a:fld id="{D63A4122-3B30-4490-8BBB-F5C76D08DB6E}" type="datetimeFigureOut">
               <a:rPr lang="nl-NL" smtClean="0"/>
-              <a:t>21-11-2024</a:t>
+              <a:t>25-11-2024</a:t>
             </a:fld>
             <a:endParaRPr lang="nl-NL"/>
           </a:p>
@@ -2148,7 +2149,7 @@
           <a:p>
             <a:fld id="{C725739E-65A5-4D3F-B2DB-1C9379069975}" type="slidenum">
               <a:rPr lang="nl-NL" smtClean="0"/>
-              <a:t>‹nr.›</a:t>
+              <a:t>‹#›</a:t>
             </a:fld>
             <a:endParaRPr lang="nl-NL"/>
           </a:p>
@@ -2407,7 +2408,7 @@
           <a:p>
             <a:fld id="{D63A4122-3B30-4490-8BBB-F5C76D08DB6E}" type="datetimeFigureOut">
               <a:rPr lang="nl-NL" smtClean="0"/>
-              <a:t>21-11-2024</a:t>
+              <a:t>25-11-2024</a:t>
             </a:fld>
             <a:endParaRPr lang="nl-NL"/>
           </a:p>
@@ -2461,7 +2462,7 @@
           <a:p>
             <a:fld id="{C725739E-65A5-4D3F-B2DB-1C9379069975}" type="slidenum">
               <a:rPr lang="nl-NL" smtClean="0"/>
-              <a:t>‹nr.›</a:t>
+              <a:t>‹#›</a:t>
             </a:fld>
             <a:endParaRPr lang="nl-NL"/>
           </a:p>
@@ -2696,7 +2697,7 @@
           <a:p>
             <a:fld id="{D63A4122-3B30-4490-8BBB-F5C76D08DB6E}" type="datetimeFigureOut">
               <a:rPr lang="nl-NL" smtClean="0"/>
-              <a:t>21-11-2024</a:t>
+              <a:t>25-11-2024</a:t>
             </a:fld>
             <a:endParaRPr lang="nl-NL"/>
           </a:p>
@@ -2750,7 +2751,7 @@
           <a:p>
             <a:fld id="{C725739E-65A5-4D3F-B2DB-1C9379069975}" type="slidenum">
               <a:rPr lang="nl-NL" smtClean="0"/>
-              <a:t>‹nr.›</a:t>
+              <a:t>‹#›</a:t>
             </a:fld>
             <a:endParaRPr lang="nl-NL"/>
           </a:p>
@@ -2939,7 +2940,7 @@
           <a:p>
             <a:fld id="{D63A4122-3B30-4490-8BBB-F5C76D08DB6E}" type="datetimeFigureOut">
               <a:rPr lang="nl-NL" smtClean="0"/>
-              <a:t>21-11-2024</a:t>
+              <a:t>25-11-2024</a:t>
             </a:fld>
             <a:endParaRPr lang="nl-NL"/>
           </a:p>
@@ -3029,7 +3030,7 @@
           <a:p>
             <a:fld id="{C725739E-65A5-4D3F-B2DB-1C9379069975}" type="slidenum">
               <a:rPr lang="nl-NL" smtClean="0"/>
-              <a:t>‹nr.›</a:t>
+              <a:t>‹#›</a:t>
             </a:fld>
             <a:endParaRPr lang="nl-NL"/>
           </a:p>
@@ -3424,11 +3425,7 @@
             </a:r>
             <a:r>
               <a:rPr lang="en-US" dirty="0"/>
-              <a:t> van </a:t>
-            </a:r>
-            <a:r>
-              <a:rPr lang="en-US" dirty="0" err="1"/>
-              <a:t>github</a:t>
+              <a:t> van GitHub</a:t>
             </a:r>
             <a:endParaRPr lang="nl-NL" dirty="0"/>
           </a:p>
@@ -3448,6 +3445,380 @@
 </file>
 
 <file path=ppt/slides/slide10.xml><?xml version="1.0" encoding="utf-8"?>
+<p:sld xmlns:a="http://schemas.openxmlformats.org/drawingml/2006/main" xmlns:r="http://schemas.openxmlformats.org/officeDocument/2006/relationships" xmlns:p="http://schemas.openxmlformats.org/presentationml/2006/main">
+  <p:cSld>
+    <p:spTree>
+      <p:nvGrpSpPr>
+        <p:cNvPr id="1" name="">
+          <a:extLst>
+            <a:ext uri="{FF2B5EF4-FFF2-40B4-BE49-F238E27FC236}">
+              <a16:creationId xmlns:a16="http://schemas.microsoft.com/office/drawing/2014/main" id="{B4D6134D-60AC-6763-E0D9-C786A98F3931}"/>
+            </a:ext>
+          </a:extLst>
+        </p:cNvPr>
+        <p:cNvGrpSpPr/>
+        <p:nvPr/>
+      </p:nvGrpSpPr>
+      <p:grpSpPr>
+        <a:xfrm>
+          <a:off x="0" y="0"/>
+          <a:ext cx="0" cy="0"/>
+          <a:chOff x="0" y="0"/>
+          <a:chExt cx="0" cy="0"/>
+        </a:xfrm>
+      </p:grpSpPr>
+      <p:sp>
+        <p:nvSpPr>
+          <p:cNvPr id="2" name="Title 1">
+            <a:extLst>
+              <a:ext uri="{FF2B5EF4-FFF2-40B4-BE49-F238E27FC236}">
+                <a16:creationId xmlns:a16="http://schemas.microsoft.com/office/drawing/2014/main" id="{0B242A5E-1B4C-445F-623E-9C1549B89136}"/>
+              </a:ext>
+            </a:extLst>
+          </p:cNvPr>
+          <p:cNvSpPr>
+            <a:spLocks noGrp="1"/>
+          </p:cNvSpPr>
+          <p:nvPr>
+            <p:ph type="title"/>
+          </p:nvPr>
+        </p:nvSpPr>
+        <p:spPr/>
+        <p:txBody>
+          <a:bodyPr/>
+          <a:lstStyle/>
+          <a:p>
+            <a:r>
+              <a:rPr lang="en-US" dirty="0"/>
+              <a:t>De </a:t>
+            </a:r>
+            <a:r>
+              <a:rPr lang="en-US" dirty="0" err="1"/>
+              <a:t>opdracht</a:t>
+            </a:r>
+            <a:r>
+              <a:rPr lang="en-US" dirty="0"/>
+              <a:t> (</a:t>
+            </a:r>
+            <a:r>
+              <a:rPr lang="en-US" dirty="0" err="1"/>
+              <a:t>vervolg</a:t>
+            </a:r>
+            <a:r>
+              <a:rPr lang="en-US" dirty="0"/>
+              <a:t>)</a:t>
+            </a:r>
+            <a:endParaRPr lang="nl-NL" dirty="0"/>
+          </a:p>
+        </p:txBody>
+      </p:sp>
+      <p:sp>
+        <p:nvSpPr>
+          <p:cNvPr id="4" name="Content Placeholder 3">
+            <a:extLst>
+              <a:ext uri="{FF2B5EF4-FFF2-40B4-BE49-F238E27FC236}">
+                <a16:creationId xmlns:a16="http://schemas.microsoft.com/office/drawing/2014/main" id="{E5E65AD5-67BA-47E4-4223-2A714F3F5680}"/>
+              </a:ext>
+            </a:extLst>
+          </p:cNvPr>
+          <p:cNvSpPr>
+            <a:spLocks noGrp="1"/>
+          </p:cNvSpPr>
+          <p:nvPr>
+            <p:ph sz="half" idx="1"/>
+          </p:nvPr>
+        </p:nvSpPr>
+        <p:spPr>
+          <a:xfrm>
+            <a:off x="838199" y="1825625"/>
+            <a:ext cx="10964917" cy="4667250"/>
+          </a:xfrm>
+        </p:spPr>
+        <p:txBody>
+          <a:bodyPr>
+            <a:normAutofit/>
+          </a:bodyPr>
+          <a:lstStyle/>
+          <a:p>
+            <a:pPr marL="0" indent="0">
+              <a:buNone/>
+            </a:pPr>
+            <a:r>
+              <a:rPr lang="en-US" dirty="0"/>
+              <a:t>Op </a:t>
+            </a:r>
+            <a:r>
+              <a:rPr lang="en-US" dirty="0" err="1"/>
+              <a:t>één</a:t>
+            </a:r>
+            <a:r>
+              <a:rPr lang="en-US" dirty="0"/>
+              <a:t> computer, </a:t>
+            </a:r>
+            <a:r>
+              <a:rPr lang="en-US" dirty="0" err="1"/>
+              <a:t>wel</a:t>
+            </a:r>
+            <a:r>
+              <a:rPr lang="en-US" dirty="0"/>
+              <a:t> </a:t>
+            </a:r>
+            <a:r>
+              <a:rPr lang="en-US" dirty="0" err="1"/>
+              <a:t>gezamenlijk</a:t>
+            </a:r>
+            <a:r>
+              <a:rPr lang="en-US" dirty="0"/>
+              <a:t>:</a:t>
+            </a:r>
+          </a:p>
+          <a:p>
+            <a:pPr marL="514350" indent="-514350">
+              <a:buFont typeface="+mj-lt"/>
+              <a:buAutoNum type="arabicPeriod"/>
+            </a:pPr>
+            <a:r>
+              <a:rPr lang="en-US" dirty="0"/>
+              <a:t>Pull alle branches </a:t>
+            </a:r>
+            <a:r>
+              <a:rPr lang="en-US" dirty="0" err="1"/>
+              <a:t>naar</a:t>
+            </a:r>
+            <a:r>
+              <a:rPr lang="en-US" dirty="0"/>
+              <a:t> </a:t>
+            </a:r>
+            <a:r>
+              <a:rPr lang="en-US" dirty="0" err="1"/>
+              <a:t>jouw</a:t>
+            </a:r>
+            <a:r>
+              <a:rPr lang="en-US" dirty="0"/>
+              <a:t> eigen </a:t>
+            </a:r>
+            <a:r>
+              <a:rPr lang="en-US" dirty="0" err="1"/>
+              <a:t>werkdirectory</a:t>
+            </a:r>
+            <a:r>
+              <a:rPr lang="en-US" dirty="0"/>
+              <a:t>.</a:t>
+            </a:r>
+            <a:br>
+              <a:rPr lang="en-US" dirty="0"/>
+            </a:br>
+            <a:r>
+              <a:rPr lang="en-US" dirty="0">
+                <a:latin typeface="Courier New" panose="02070309020205020404" pitchFamily="49" charset="0"/>
+                <a:cs typeface="Courier New" panose="02070309020205020404" pitchFamily="49" charset="0"/>
+              </a:rPr>
+              <a:t>git fetch</a:t>
+            </a:r>
+            <a:r>
+              <a:rPr lang="en-US" dirty="0"/>
+              <a:t> </a:t>
+            </a:r>
+            <a:r>
+              <a:rPr lang="en-US" dirty="0" err="1"/>
+              <a:t>en</a:t>
+            </a:r>
+            <a:r>
+              <a:rPr lang="en-US" dirty="0"/>
+              <a:t> </a:t>
+            </a:r>
+            <a:r>
+              <a:rPr lang="en-US" dirty="0">
+                <a:latin typeface="Courier New" panose="02070309020205020404" pitchFamily="49" charset="0"/>
+                <a:cs typeface="Courier New" panose="02070309020205020404" pitchFamily="49" charset="0"/>
+              </a:rPr>
+              <a:t>git checkout </a:t>
+            </a:r>
+            <a:r>
+              <a:rPr lang="en-US" dirty="0" err="1">
+                <a:latin typeface="Courier New" panose="02070309020205020404" pitchFamily="49" charset="0"/>
+                <a:cs typeface="Courier New" panose="02070309020205020404" pitchFamily="49" charset="0"/>
+              </a:rPr>
+              <a:t>branch_name</a:t>
+            </a:r>
+            <a:endParaRPr lang="en-US" dirty="0">
+              <a:latin typeface="Courier New" panose="02070309020205020404" pitchFamily="49" charset="0"/>
+              <a:cs typeface="Courier New" panose="02070309020205020404" pitchFamily="49" charset="0"/>
+            </a:endParaRPr>
+          </a:p>
+          <a:p>
+            <a:pPr marL="514350" indent="-514350">
+              <a:buFont typeface="+mj-lt"/>
+              <a:buAutoNum type="arabicPeriod"/>
+            </a:pPr>
+            <a:r>
+              <a:rPr lang="en-US" dirty="0">
+                <a:cs typeface="Courier New" panose="02070309020205020404" pitchFamily="49" charset="0"/>
+              </a:rPr>
+              <a:t>Check de branch main </a:t>
+            </a:r>
+            <a:r>
+              <a:rPr lang="en-US" dirty="0" err="1">
+                <a:cs typeface="Courier New" panose="02070309020205020404" pitchFamily="49" charset="0"/>
+              </a:rPr>
+              <a:t>uit</a:t>
+            </a:r>
+            <a:endParaRPr lang="en-US" dirty="0">
+              <a:cs typeface="Courier New" panose="02070309020205020404" pitchFamily="49" charset="0"/>
+            </a:endParaRPr>
+          </a:p>
+          <a:p>
+            <a:pPr marL="514350" indent="-514350">
+              <a:buFont typeface="+mj-lt"/>
+              <a:buAutoNum type="arabicPeriod"/>
+            </a:pPr>
+            <a:r>
+              <a:rPr lang="en-US" dirty="0"/>
+              <a:t>Merge </a:t>
+            </a:r>
+            <a:r>
+              <a:rPr lang="en-US" b="1" dirty="0" err="1"/>
+              <a:t>een-voor-een</a:t>
+            </a:r>
+            <a:r>
+              <a:rPr lang="en-US" dirty="0"/>
+              <a:t> alle branches in de main-branch</a:t>
+            </a:r>
+          </a:p>
+          <a:p>
+            <a:pPr marL="514350" indent="-514350">
+              <a:buFont typeface="+mj-lt"/>
+              <a:buAutoNum type="arabicPeriod"/>
+            </a:pPr>
+            <a:r>
+              <a:rPr lang="en-US" dirty="0" err="1"/>
+              <a:t>Plaats</a:t>
+            </a:r>
+            <a:r>
+              <a:rPr lang="en-US" dirty="0"/>
+              <a:t> het </a:t>
+            </a:r>
+            <a:r>
+              <a:rPr lang="en-US" dirty="0" err="1"/>
+              <a:t>eindproduct</a:t>
+            </a:r>
+            <a:r>
+              <a:rPr lang="en-US" dirty="0"/>
+              <a:t> op de ma-cloud van </a:t>
+            </a:r>
+            <a:r>
+              <a:rPr lang="en-US" dirty="0" err="1"/>
+              <a:t>een</a:t>
+            </a:r>
+            <a:r>
+              <a:rPr lang="en-US" dirty="0"/>
+              <a:t> van de </a:t>
+            </a:r>
+            <a:r>
+              <a:rPr lang="en-US" dirty="0" err="1"/>
+              <a:t>teamleden</a:t>
+            </a:r>
+            <a:r>
+              <a:rPr lang="en-US" dirty="0"/>
+              <a:t> </a:t>
+            </a:r>
+          </a:p>
+          <a:p>
+            <a:pPr marL="514350" indent="-514350">
+              <a:buFont typeface="+mj-lt"/>
+              <a:buAutoNum type="arabicPeriod"/>
+            </a:pPr>
+            <a:r>
+              <a:rPr lang="en-US" dirty="0"/>
+              <a:t>Maak in de README.md </a:t>
+            </a:r>
+            <a:r>
+              <a:rPr lang="en-US" dirty="0" err="1"/>
+              <a:t>een</a:t>
+            </a:r>
+            <a:r>
+              <a:rPr lang="en-US" dirty="0"/>
+              <a:t> </a:t>
+            </a:r>
+            <a:r>
+              <a:rPr lang="en-US" dirty="0" err="1"/>
+              <a:t>duidelijke</a:t>
+            </a:r>
+            <a:r>
+              <a:rPr lang="en-US" dirty="0"/>
+              <a:t> link </a:t>
+            </a:r>
+            <a:r>
+              <a:rPr lang="en-US" dirty="0" err="1"/>
+              <a:t>naar</a:t>
+            </a:r>
+            <a:r>
+              <a:rPr lang="en-US" dirty="0"/>
+              <a:t> </a:t>
+            </a:r>
+            <a:r>
+              <a:rPr lang="en-US" dirty="0" err="1"/>
+              <a:t>dit</a:t>
+            </a:r>
+            <a:r>
+              <a:rPr lang="en-US" dirty="0"/>
+              <a:t> </a:t>
+            </a:r>
+            <a:r>
+              <a:rPr lang="en-US" dirty="0" err="1"/>
+              <a:t>eindproduct</a:t>
+            </a:r>
+            <a:endParaRPr lang="en-US" dirty="0"/>
+          </a:p>
+          <a:p>
+            <a:pPr marL="514350" indent="-514350">
+              <a:buFont typeface="+mj-lt"/>
+              <a:buAutoNum type="arabicPeriod"/>
+            </a:pPr>
+            <a:r>
+              <a:rPr lang="en-US" dirty="0"/>
+              <a:t>Push het </a:t>
+            </a:r>
+            <a:r>
+              <a:rPr lang="en-US" dirty="0" err="1"/>
+              <a:t>eindproduct</a:t>
+            </a:r>
+            <a:r>
+              <a:rPr lang="en-US" dirty="0"/>
+              <a:t> </a:t>
+            </a:r>
+            <a:r>
+              <a:rPr lang="en-US" dirty="0" err="1"/>
+              <a:t>naar</a:t>
+            </a:r>
+            <a:r>
+              <a:rPr lang="en-US" dirty="0"/>
+              <a:t> de remote repository (branch main)</a:t>
+            </a:r>
+          </a:p>
+          <a:p>
+            <a:pPr marL="514350" indent="-514350">
+              <a:buFont typeface="+mj-lt"/>
+              <a:buAutoNum type="arabicPeriod"/>
+            </a:pPr>
+            <a:endParaRPr lang="en-US" dirty="0"/>
+          </a:p>
+        </p:txBody>
+      </p:sp>
+    </p:spTree>
+    <p:extLst>
+      <p:ext uri="{BB962C8B-B14F-4D97-AF65-F5344CB8AC3E}">
+        <p14:creationId xmlns:p14="http://schemas.microsoft.com/office/powerpoint/2010/main" val="4256530953"/>
+      </p:ext>
+    </p:extLst>
+  </p:cSld>
+  <p:clrMapOvr>
+    <a:masterClrMapping/>
+  </p:clrMapOvr>
+</p:sld>
+</file>
+
+<file path=ppt/slides/slide11.xml><?xml version="1.0" encoding="utf-8"?>
 <p:sld xmlns:a="http://schemas.openxmlformats.org/drawingml/2006/main" xmlns:r="http://schemas.openxmlformats.org/officeDocument/2006/relationships" xmlns:p="http://schemas.openxmlformats.org/presentationml/2006/main">
   <p:cSld>
     <p:spTree>
@@ -3578,7 +3949,7 @@
             </a:r>
             <a:r>
               <a:rPr lang="en-US" dirty="0" err="1"/>
-              <a:t>simulise</a:t>
+              <a:t>Simulise</a:t>
             </a:r>
             <a:endParaRPr lang="en-US" dirty="0"/>
           </a:p>
@@ -3685,7 +4056,15 @@
             </a:r>
             <a:r>
               <a:rPr lang="nl-NL" dirty="0"/>
-              <a:t> op GitHub is het proces waarbij veranderingen (</a:t>
+              <a:t> op </a:t>
+            </a:r>
+            <a:r>
+              <a:rPr lang="nl-NL" b="1" dirty="0"/>
+              <a:t>GitHub</a:t>
+            </a:r>
+            <a:r>
+              <a:rPr lang="nl-NL" dirty="0"/>
+              <a:t> is het proces waarbij veranderingen (</a:t>
             </a:r>
             <a:r>
               <a:rPr lang="nl-NL" dirty="0" err="1"/>
@@ -3714,12 +4093,19 @@
               <a:t>Het doel van een </a:t>
             </a:r>
             <a:r>
-              <a:rPr lang="nl-NL" dirty="0" err="1"/>
+              <a:rPr lang="nl-NL" b="1" dirty="0" err="1"/>
               <a:t>merge</a:t>
             </a:r>
             <a:r>
               <a:rPr lang="nl-NL" dirty="0"/>
-              <a:t> is om de wijzigingen die op afzonderlijke takken zijn gemaakt samen te brengen, zodat ze samen verder kunnen worden gebruikt of ontwikkeld.</a:t>
+              <a:t> is om de wijzigingen die op afzonderlijke branches (takken) zijn gemaakt, samen te brengen.</a:t>
+            </a:r>
+            <a:br>
+              <a:rPr lang="nl-NL" dirty="0"/>
+            </a:br>
+            <a:r>
+              <a:rPr lang="nl-NL" dirty="0"/>
+              <a:t>Zodat ze samen verder kunnen worden gebruikt of ontwikkeld.</a:t>
             </a:r>
           </a:p>
           <a:p>
@@ -3779,8 +4165,12 @@
           <a:lstStyle/>
           <a:p>
             <a:r>
-              <a:rPr lang="en-US" dirty="0"/>
-              <a:t>Doel van de les</a:t>
+              <a:rPr lang="en-US" dirty="0" err="1"/>
+              <a:t>Doelen</a:t>
+            </a:r>
+            <a:r>
+              <a:rPr lang="en-US" dirty="0"/>
+              <a:t> van de les</a:t>
             </a:r>
             <a:endParaRPr lang="nl-NL" dirty="0"/>
           </a:p>
@@ -3814,6 +4204,10 @@
           </a:bodyPr>
           <a:lstStyle/>
           <a:p>
+            <a:pPr marL="514350" indent="-514350">
+              <a:buFont typeface="+mj-lt"/>
+              <a:buAutoNum type="arabicPeriod"/>
+            </a:pPr>
             <a:r>
               <a:rPr lang="en-US" dirty="0" err="1"/>
               <a:t>Werken</a:t>
@@ -3830,24 +4224,28 @@
               <a:rPr lang="en-US" dirty="0"/>
               <a:t> branches </a:t>
             </a:r>
-          </a:p>
-          <a:p>
+            <a:br>
+              <a:rPr lang="en-US" dirty="0"/>
+            </a:br>
+            <a:br>
+              <a:rPr lang="en-US" dirty="0"/>
+            </a:br>
+            <a:br>
+              <a:rPr lang="en-US" dirty="0"/>
+            </a:br>
+            <a:br>
+              <a:rPr lang="en-US" dirty="0"/>
+            </a:br>
             <a:endParaRPr lang="en-US" dirty="0"/>
           </a:p>
           <a:p>
-            <a:endParaRPr lang="en-US" dirty="0"/>
-          </a:p>
-          <a:p>
-            <a:endParaRPr lang="en-US" dirty="0"/>
-          </a:p>
-          <a:p>
-            <a:r>
-              <a:rPr lang="en-US" dirty="0" err="1"/>
-              <a:t>en</a:t>
-            </a:r>
-            <a:r>
-              <a:rPr lang="en-US" dirty="0"/>
-              <a:t> de branches </a:t>
+            <a:pPr marL="514350" indent="-514350">
+              <a:buFont typeface="+mj-lt"/>
+              <a:buAutoNum type="arabicPeriod"/>
+            </a:pPr>
+            <a:r>
+              <a:rPr lang="en-US" dirty="0"/>
+              <a:t>Branches </a:t>
             </a:r>
             <a:r>
               <a:rPr lang="en-US" dirty="0" err="1"/>
@@ -3903,7 +4301,7 @@
         </p:nvSpPr>
         <p:spPr>
           <a:xfrm>
-            <a:off x="1639469" y="4799243"/>
+            <a:off x="5591284" y="4730471"/>
             <a:ext cx="407814" cy="379485"/>
           </a:xfrm>
           <a:prstGeom prst="ellipse">
@@ -3952,7 +4350,7 @@
         </p:nvSpPr>
         <p:spPr>
           <a:xfrm>
-            <a:off x="2522581" y="5521348"/>
+            <a:off x="6474396" y="5452576"/>
             <a:ext cx="407814" cy="379485"/>
           </a:xfrm>
           <a:prstGeom prst="ellipse">
@@ -4001,7 +4399,7 @@
         </p:nvSpPr>
         <p:spPr>
           <a:xfrm>
-            <a:off x="2429421" y="6162134"/>
+            <a:off x="6381236" y="6093362"/>
             <a:ext cx="407814" cy="379485"/>
           </a:xfrm>
           <a:prstGeom prst="ellipse">
@@ -4050,7 +4448,7 @@
         </p:nvSpPr>
         <p:spPr>
           <a:xfrm>
-            <a:off x="4511141" y="5536295"/>
+            <a:off x="8462956" y="5467523"/>
             <a:ext cx="407814" cy="379485"/>
           </a:xfrm>
           <a:prstGeom prst="ellipse">
@@ -4099,7 +4497,7 @@
         </p:nvSpPr>
         <p:spPr>
           <a:xfrm>
-            <a:off x="5246962" y="6180593"/>
+            <a:off x="9198777" y="6111821"/>
             <a:ext cx="407814" cy="379485"/>
           </a:xfrm>
           <a:prstGeom prst="ellipse">
@@ -4151,7 +4549,7 @@
         </p:nvCxnSpPr>
         <p:spPr>
           <a:xfrm>
-            <a:off x="2047283" y="4988986"/>
+            <a:off x="5999098" y="4920214"/>
             <a:ext cx="475298" cy="722105"/>
           </a:xfrm>
           <a:prstGeom prst="curvedConnector3">
@@ -4191,7 +4589,7 @@
         </p:nvCxnSpPr>
         <p:spPr>
           <a:xfrm>
-            <a:off x="2047283" y="4988986"/>
+            <a:off x="5999098" y="4920214"/>
             <a:ext cx="382138" cy="1362891"/>
           </a:xfrm>
           <a:prstGeom prst="curvedConnector3">
@@ -4231,7 +4629,7 @@
         </p:nvCxnSpPr>
         <p:spPr>
           <a:xfrm>
-            <a:off x="2930395" y="5711091"/>
+            <a:off x="6882210" y="5642319"/>
             <a:ext cx="1580746" cy="14947"/>
           </a:xfrm>
           <a:prstGeom prst="line">
@@ -4271,7 +4669,7 @@
         </p:nvCxnSpPr>
         <p:spPr>
           <a:xfrm>
-            <a:off x="2837235" y="6351877"/>
+            <a:off x="6789050" y="6283105"/>
             <a:ext cx="2409727" cy="18459"/>
           </a:xfrm>
           <a:prstGeom prst="line">
@@ -4307,7 +4705,7 @@
         </p:nvSpPr>
         <p:spPr>
           <a:xfrm>
-            <a:off x="5591284" y="1869061"/>
+            <a:off x="5688186" y="1604998"/>
             <a:ext cx="407814" cy="379485"/>
           </a:xfrm>
           <a:prstGeom prst="ellipse">
@@ -4356,7 +4754,7 @@
         </p:nvSpPr>
         <p:spPr>
           <a:xfrm>
-            <a:off x="6556317" y="2522254"/>
+            <a:off x="6653219" y="2258191"/>
             <a:ext cx="407814" cy="379485"/>
           </a:xfrm>
           <a:prstGeom prst="ellipse">
@@ -4405,7 +4803,7 @@
         </p:nvSpPr>
         <p:spPr>
           <a:xfrm>
-            <a:off x="6463157" y="3163040"/>
+            <a:off x="6560059" y="2898977"/>
             <a:ext cx="407814" cy="379485"/>
           </a:xfrm>
           <a:prstGeom prst="ellipse">
@@ -4454,7 +4852,7 @@
         </p:nvSpPr>
         <p:spPr>
           <a:xfrm>
-            <a:off x="8544877" y="2537201"/>
+            <a:off x="8641779" y="2273138"/>
             <a:ext cx="407814" cy="379485"/>
           </a:xfrm>
           <a:prstGeom prst="ellipse">
@@ -4503,7 +4901,7 @@
         </p:nvSpPr>
         <p:spPr>
           <a:xfrm>
-            <a:off x="8622699" y="3158229"/>
+            <a:off x="8719601" y="2894166"/>
             <a:ext cx="407814" cy="379485"/>
           </a:xfrm>
           <a:prstGeom prst="ellipse">
@@ -4556,7 +4954,7 @@
         </p:nvCxnSpPr>
         <p:spPr>
           <a:xfrm>
-            <a:off x="5999098" y="2058804"/>
+            <a:off x="6096000" y="1794741"/>
             <a:ext cx="557219" cy="653193"/>
           </a:xfrm>
           <a:prstGeom prst="curvedConnector3">
@@ -4596,7 +4994,7 @@
         </p:nvCxnSpPr>
         <p:spPr>
           <a:xfrm>
-            <a:off x="5999098" y="2058804"/>
+            <a:off x="6096000" y="1794741"/>
             <a:ext cx="464059" cy="1293979"/>
           </a:xfrm>
           <a:prstGeom prst="curvedConnector3">
@@ -4636,7 +5034,7 @@
         </p:nvCxnSpPr>
         <p:spPr>
           <a:xfrm>
-            <a:off x="6964131" y="2711997"/>
+            <a:off x="7061033" y="2447934"/>
             <a:ext cx="1580746" cy="14947"/>
           </a:xfrm>
           <a:prstGeom prst="line">
@@ -4676,7 +5074,7 @@
         </p:nvCxnSpPr>
         <p:spPr>
           <a:xfrm flipV="1">
-            <a:off x="6870971" y="3347972"/>
+            <a:off x="6967873" y="3083909"/>
             <a:ext cx="1751728" cy="4811"/>
           </a:xfrm>
           <a:prstGeom prst="line">
@@ -4712,7 +5110,7 @@
         </p:nvSpPr>
         <p:spPr>
           <a:xfrm>
-            <a:off x="5387377" y="4790000"/>
+            <a:off x="9339192" y="4721228"/>
             <a:ext cx="407814" cy="379485"/>
           </a:xfrm>
           <a:prstGeom prst="ellipse">
@@ -4765,7 +5163,7 @@
         </p:nvCxnSpPr>
         <p:spPr>
           <a:xfrm flipV="1">
-            <a:off x="4918955" y="4979743"/>
+            <a:off x="8870770" y="4910971"/>
             <a:ext cx="468422" cy="746295"/>
           </a:xfrm>
           <a:prstGeom prst="curvedConnector3">
@@ -4803,7 +5201,7 @@
         </p:nvSpPr>
         <p:spPr>
           <a:xfrm>
-            <a:off x="6304396" y="4787096"/>
+            <a:off x="10256211" y="4718324"/>
             <a:ext cx="407814" cy="379485"/>
           </a:xfrm>
           <a:prstGeom prst="ellipse">
@@ -4856,7 +5254,7 @@
         </p:nvCxnSpPr>
         <p:spPr>
           <a:xfrm flipV="1">
-            <a:off x="5654776" y="4976839"/>
+            <a:off x="9606591" y="4908067"/>
             <a:ext cx="649620" cy="1393497"/>
           </a:xfrm>
           <a:prstGeom prst="curvedConnector3">
@@ -4897,7 +5295,7 @@
         </p:nvCxnSpPr>
         <p:spPr>
           <a:xfrm flipV="1">
-            <a:off x="2047283" y="4979743"/>
+            <a:off x="5999098" y="4910971"/>
             <a:ext cx="3340094" cy="9243"/>
           </a:xfrm>
           <a:prstGeom prst="line">
@@ -4936,7 +5334,7 @@
         </p:nvCxnSpPr>
         <p:spPr>
           <a:xfrm flipV="1">
-            <a:off x="5795191" y="4976839"/>
+            <a:off x="9747006" y="4908067"/>
             <a:ext cx="509205" cy="2904"/>
           </a:xfrm>
           <a:prstGeom prst="line">
@@ -4974,7 +5372,7 @@
         </p:nvCxnSpPr>
         <p:spPr>
           <a:xfrm>
-            <a:off x="5999715" y="2041073"/>
+            <a:off x="6096617" y="1777010"/>
             <a:ext cx="1623467" cy="17731"/>
           </a:xfrm>
           <a:prstGeom prst="line">
@@ -5010,7 +5408,7 @@
         </p:nvSpPr>
         <p:spPr>
           <a:xfrm>
-            <a:off x="7623182" y="1640765"/>
+            <a:off x="7720084" y="1376702"/>
             <a:ext cx="999517" cy="369332"/>
           </a:xfrm>
           <a:prstGeom prst="rect">
@@ -5052,7 +5450,7 @@
         </p:nvSpPr>
         <p:spPr>
           <a:xfrm>
-            <a:off x="7097418" y="2357611"/>
+            <a:off x="7194320" y="2093548"/>
             <a:ext cx="1346191" cy="369332"/>
           </a:xfrm>
           <a:prstGeom prst="rect">
@@ -5094,7 +5492,7 @@
         </p:nvSpPr>
         <p:spPr>
           <a:xfrm>
-            <a:off x="7073739" y="3028534"/>
+            <a:off x="7170641" y="2764471"/>
             <a:ext cx="1346191" cy="369332"/>
           </a:xfrm>
           <a:prstGeom prst="rect">
@@ -5136,7 +5534,7 @@
         </p:nvSpPr>
         <p:spPr>
           <a:xfrm>
-            <a:off x="3623277" y="4619654"/>
+            <a:off x="7575092" y="4550882"/>
             <a:ext cx="999517" cy="369332"/>
           </a:xfrm>
           <a:prstGeom prst="rect">
@@ -5178,7 +5576,7 @@
         </p:nvSpPr>
         <p:spPr>
           <a:xfrm>
-            <a:off x="3097513" y="5336500"/>
+            <a:off x="7049328" y="5267728"/>
             <a:ext cx="1346191" cy="369332"/>
           </a:xfrm>
           <a:prstGeom prst="rect">
@@ -5220,7 +5618,7 @@
         </p:nvSpPr>
         <p:spPr>
           <a:xfrm>
-            <a:off x="3073834" y="6007423"/>
+            <a:off x="7025649" y="5938651"/>
             <a:ext cx="1346191" cy="369332"/>
           </a:xfrm>
           <a:prstGeom prst="rect">
@@ -5317,7 +5715,7 @@
             </a:r>
             <a:r>
               <a:rPr lang="en-US" dirty="0"/>
-              <a:t> merge</a:t>
+              <a:t> merge?</a:t>
             </a:r>
             <a:endParaRPr lang="nl-NL" dirty="0"/>
           </a:p>
@@ -5341,8 +5739,8 @@
         </p:nvSpPr>
         <p:spPr>
           <a:xfrm>
-            <a:off x="0" y="1825625"/>
-            <a:ext cx="12192000" cy="4351338"/>
+            <a:off x="838200" y="1825625"/>
+            <a:ext cx="11353800" cy="4351338"/>
           </a:xfrm>
         </p:spPr>
         <p:txBody>
@@ -5384,15 +5782,42 @@
               <a:rPr lang="en-US" dirty="0" err="1"/>
               <a:t>samenvoegen</a:t>
             </a:r>
+            <a:r>
+              <a:rPr lang="en-US" dirty="0"/>
+              <a:t> met de </a:t>
+            </a:r>
+            <a:r>
+              <a:rPr lang="en-US" dirty="0" err="1"/>
+              <a:t>volgende</a:t>
+            </a:r>
+            <a:r>
+              <a:rPr lang="en-US" dirty="0"/>
+              <a:t> </a:t>
+            </a:r>
+            <a:r>
+              <a:rPr lang="en-US" dirty="0" err="1"/>
+              <a:t>stappen</a:t>
+            </a:r>
+            <a:r>
+              <a:rPr lang="en-US" dirty="0"/>
+              <a:t>:</a:t>
+            </a:r>
+          </a:p>
+          <a:p>
             <a:endParaRPr lang="en-US" dirty="0"/>
           </a:p>
           <a:p>
-            <a:endParaRPr lang="en-US" dirty="0"/>
-          </a:p>
-          <a:p>
-            <a:r>
-              <a:rPr lang="en-US" dirty="0"/>
-              <a:t>Checkout de branch </a:t>
+            <a:pPr marL="514350" indent="-514350">
+              <a:buFont typeface="+mj-lt"/>
+              <a:buAutoNum type="arabicPeriod"/>
+            </a:pPr>
+            <a:r>
+              <a:rPr lang="en-US" dirty="0" err="1"/>
+              <a:t>Laad</a:t>
+            </a:r>
+            <a:r>
+              <a:rPr lang="en-US" dirty="0"/>
+              <a:t> de branch </a:t>
             </a:r>
             <a:r>
               <a:rPr lang="en-US" dirty="0" err="1"/>
@@ -5403,64 +5828,98 @@
               <a:t> je het </a:t>
             </a:r>
             <a:r>
-              <a:rPr lang="en-US" dirty="0" err="1"/>
+              <a:rPr lang="en-US" b="1" dirty="0" err="1"/>
               <a:t>eindproduct</a:t>
             </a:r>
             <a:r>
               <a:rPr lang="en-US" dirty="0"/>
+              <a:t> in </a:t>
+            </a:r>
+            <a:r>
+              <a:rPr lang="en-US" dirty="0" err="1"/>
+              <a:t>wil</a:t>
+            </a:r>
+            <a:r>
+              <a:rPr lang="en-US" dirty="0"/>
               <a:t> </a:t>
             </a:r>
             <a:r>
               <a:rPr lang="en-US" dirty="0" err="1"/>
-              <a:t>wil</a:t>
-            </a:r>
-            <a:r>
-              <a:rPr lang="en-US" dirty="0"/>
-              <a:t> </a:t>
-            </a:r>
-            <a:r>
-              <a:rPr lang="en-US" dirty="0" err="1"/>
               <a:t>hebben</a:t>
             </a:r>
-            <a:endParaRPr lang="en-US" dirty="0"/>
-          </a:p>
-          <a:p>
-            <a:r>
-              <a:rPr lang="en-US" b="1" dirty="0">
+            <a:r>
+              <a:rPr lang="en-US" dirty="0"/>
+              <a:t>. </a:t>
+            </a:r>
+            <a:br>
+              <a:rPr lang="en-US" dirty="0"/>
+            </a:br>
+            <a:r>
+              <a:rPr lang="en-US" dirty="0">
                 <a:latin typeface="Courier New" panose="02070309020205020404" pitchFamily="49" charset="0"/>
                 <a:cs typeface="Courier New" panose="02070309020205020404" pitchFamily="49" charset="0"/>
               </a:rPr>
-              <a:t>git merge [naam van de branch die je </a:t>
-            </a:r>
-            <a:r>
-              <a:rPr lang="en-US" b="1" dirty="0" err="1">
+              <a:t>git checkout </a:t>
+            </a:r>
+            <a:r>
+              <a:rPr lang="en-US" dirty="0" err="1">
                 <a:latin typeface="Courier New" panose="02070309020205020404" pitchFamily="49" charset="0"/>
                 <a:cs typeface="Courier New" panose="02070309020205020404" pitchFamily="49" charset="0"/>
               </a:rPr>
-              <a:t>wil</a:t>
-            </a:r>
-            <a:r>
-              <a:rPr lang="en-US" b="1" dirty="0">
+              <a:t>branch_name</a:t>
+            </a:r>
+            <a:endParaRPr lang="en-US" dirty="0">
+              <a:latin typeface="Courier New" panose="02070309020205020404" pitchFamily="49" charset="0"/>
+              <a:cs typeface="Courier New" panose="02070309020205020404" pitchFamily="49" charset="0"/>
+            </a:endParaRPr>
+          </a:p>
+          <a:p>
+            <a:pPr marL="514350" indent="-514350">
+              <a:buFont typeface="+mj-lt"/>
+              <a:buAutoNum type="arabicPeriod"/>
+            </a:pPr>
+            <a:r>
+              <a:rPr lang="en-US" dirty="0" err="1"/>
+              <a:t>Voeg</a:t>
+            </a:r>
+            <a:r>
+              <a:rPr lang="en-US" dirty="0"/>
+              <a:t> de branch in de </a:t>
+            </a:r>
+            <a:r>
+              <a:rPr lang="en-US" dirty="0" err="1"/>
+              <a:t>huidige</a:t>
+            </a:r>
+            <a:r>
+              <a:rPr lang="en-US" dirty="0"/>
+              <a:t> branch met de </a:t>
+            </a:r>
+            <a:r>
+              <a:rPr lang="en-US" dirty="0" err="1"/>
+              <a:t>nieuwe</a:t>
+            </a:r>
+            <a:r>
+              <a:rPr lang="en-US" dirty="0"/>
+              <a:t> updates.</a:t>
+            </a:r>
+            <a:br>
+              <a:rPr lang="en-US" dirty="0"/>
+            </a:br>
+            <a:r>
+              <a:rPr lang="en-US" dirty="0">
                 <a:latin typeface="Courier New" panose="02070309020205020404" pitchFamily="49" charset="0"/>
                 <a:cs typeface="Courier New" panose="02070309020205020404" pitchFamily="49" charset="0"/>
               </a:rPr>
-              <a:t> </a:t>
-            </a:r>
-            <a:r>
-              <a:rPr lang="en-US" b="1" dirty="0" err="1">
+              <a:t>git merge </a:t>
+            </a:r>
+            <a:r>
+              <a:rPr lang="en-US" dirty="0" err="1">
                 <a:latin typeface="Courier New" panose="02070309020205020404" pitchFamily="49" charset="0"/>
                 <a:cs typeface="Courier New" panose="02070309020205020404" pitchFamily="49" charset="0"/>
               </a:rPr>
-              <a:t>samenvoegen</a:t>
-            </a:r>
-            <a:r>
-              <a:rPr lang="en-US" b="1" dirty="0">
-                <a:latin typeface="Courier New" panose="02070309020205020404" pitchFamily="49" charset="0"/>
-                <a:cs typeface="Courier New" panose="02070309020205020404" pitchFamily="49" charset="0"/>
-              </a:rPr>
-              <a:t>]</a:t>
-            </a:r>
-            <a:endParaRPr lang="nl-NL" b="1" dirty="0">
+              <a:t>branch_name</a:t>
+            </a:r>
+            <a:endParaRPr lang="nl-NL" dirty="0">
               <a:latin typeface="Courier New" panose="02070309020205020404" pitchFamily="49" charset="0"/>
               <a:cs typeface="Courier New" panose="02070309020205020404" pitchFamily="49" charset="0"/>
             </a:endParaRPr>
@@ -5564,7 +6023,7 @@
               <a:buNone/>
             </a:pPr>
             <a:r>
-              <a:rPr lang="en-US" dirty="0"/>
+              <a:rPr lang="en-US" b="1" dirty="0"/>
               <a:t>Student 1:</a:t>
             </a:r>
           </a:p>
@@ -5649,7 +6108,10 @@
               <a:rPr lang="en-US" dirty="0" err="1"/>
               <a:t>werkdirectory</a:t>
             </a:r>
-            <a:endParaRPr lang="en-US" dirty="0"/>
+            <a:r>
+              <a:rPr lang="en-US" dirty="0"/>
+              <a:t>.</a:t>
+            </a:r>
           </a:p>
           <a:p>
             <a:pPr marL="514350" indent="-514350">
@@ -5726,7 +6188,7 @@
             </a:r>
             <a:r>
               <a:rPr lang="en-US" dirty="0"/>
-              <a:t> toe</a:t>
+              <a:t> toe.</a:t>
             </a:r>
           </a:p>
           <a:p>
@@ -5772,7 +6234,15 @@
             </a:r>
             <a:r>
               <a:rPr lang="en-US" dirty="0"/>
-              <a:t> naam skill2-2 </a:t>
+              <a:t> naam </a:t>
+            </a:r>
+            <a:r>
+              <a:rPr lang="en-US" b="1" dirty="0"/>
+              <a:t>skill2-2</a:t>
+            </a:r>
+            <a:r>
+              <a:rPr lang="en-US" dirty="0"/>
+              <a:t> </a:t>
             </a:r>
             <a:r>
               <a:rPr lang="en-US" dirty="0" err="1"/>
@@ -5974,7 +6444,7 @@
             </a:r>
             <a:r>
               <a:rPr lang="en-US" dirty="0" err="1"/>
-              <a:t>uitnodig</a:t>
+              <a:t>uitnodiging</a:t>
             </a:r>
             <a:r>
               <a:rPr lang="en-US" dirty="0"/>
@@ -6122,13 +6592,13 @@
         </p:nvSpPr>
         <p:spPr>
           <a:xfrm>
-            <a:off x="838200" y="1825625"/>
-            <a:ext cx="9152106" cy="4351338"/>
+            <a:off x="838199" y="1825625"/>
+            <a:ext cx="11269718" cy="4922016"/>
           </a:xfrm>
         </p:spPr>
         <p:txBody>
           <a:bodyPr>
-            <a:normAutofit fontScale="85000" lnSpcReduction="20000"/>
+            <a:normAutofit/>
           </a:bodyPr>
           <a:lstStyle/>
           <a:p>
@@ -6155,7 +6625,7 @@
             </a:pPr>
             <a:r>
               <a:rPr lang="en-US" dirty="0" err="1"/>
-              <a:t>Openen</a:t>
+              <a:t>Creëren</a:t>
             </a:r>
             <a:r>
               <a:rPr lang="en-US" dirty="0"/>
@@ -6163,11 +6633,19 @@
             </a:r>
             <a:r>
               <a:rPr lang="en-US" dirty="0" err="1"/>
-              <a:t>uit</a:t>
-            </a:r>
-            <a:r>
-              <a:rPr lang="en-US" dirty="0"/>
-              <a:t> de main </a:t>
+              <a:t>vanuit</a:t>
+            </a:r>
+            <a:r>
+              <a:rPr lang="en-US" dirty="0"/>
+              <a:t> de </a:t>
+            </a:r>
+            <a:r>
+              <a:rPr lang="en-US" b="1" dirty="0"/>
+              <a:t>main</a:t>
+            </a:r>
+            <a:r>
+              <a:rPr lang="en-US" dirty="0"/>
+              <a:t> </a:t>
             </a:r>
             <a:r>
               <a:rPr lang="en-US" dirty="0" err="1"/>
@@ -6196,6 +6674,27 @@
             <a:r>
               <a:rPr lang="en-US" dirty="0" err="1"/>
               <a:t>branchnaam</a:t>
+            </a:r>
+            <a:r>
+              <a:rPr lang="en-US" dirty="0"/>
+              <a:t> </a:t>
+            </a:r>
+            <a:br>
+              <a:rPr lang="en-US" dirty="0"/>
+            </a:br>
+            <a:r>
+              <a:rPr lang="en-US" dirty="0">
+                <a:latin typeface="Courier New" panose="02070309020205020404" pitchFamily="49" charset="0"/>
+                <a:cs typeface="Courier New" panose="02070309020205020404" pitchFamily="49" charset="0"/>
+              </a:rPr>
+              <a:t>git branch </a:t>
+            </a:r>
+            <a:r>
+              <a:rPr lang="en-US" dirty="0" err="1">
+                <a:latin typeface="Courier New" panose="02070309020205020404" pitchFamily="49" charset="0"/>
+                <a:cs typeface="Courier New" panose="02070309020205020404" pitchFamily="49" charset="0"/>
+              </a:rPr>
+              <a:t>mijn_naam</a:t>
             </a:r>
             <a:endParaRPr lang="en-US" dirty="0"/>
           </a:p>
@@ -6220,307 +6719,33 @@
               <a:rPr lang="en-US" dirty="0" err="1"/>
               <a:t>uit</a:t>
             </a:r>
+            <a:r>
+              <a:rPr lang="en-US" dirty="0"/>
+              <a:t> </a:t>
+            </a:r>
+            <a:br>
+              <a:rPr lang="en-US" dirty="0"/>
+            </a:br>
+            <a:r>
+              <a:rPr lang="en-US" dirty="0">
+                <a:latin typeface="Courier New" panose="02070309020205020404" pitchFamily="49" charset="0"/>
+                <a:cs typeface="Courier New" panose="02070309020205020404" pitchFamily="49" charset="0"/>
+              </a:rPr>
+              <a:t>git checkout </a:t>
+            </a:r>
+            <a:r>
+              <a:rPr lang="en-US" dirty="0" err="1">
+                <a:latin typeface="Courier New" panose="02070309020205020404" pitchFamily="49" charset="0"/>
+                <a:cs typeface="Courier New" panose="02070309020205020404" pitchFamily="49" charset="0"/>
+              </a:rPr>
+              <a:t>mijn_naam</a:t>
+            </a:r>
             <a:endParaRPr lang="en-US" dirty="0"/>
           </a:p>
           <a:p>
             <a:pPr marL="0" indent="0">
               <a:buNone/>
             </a:pPr>
-            <a:endParaRPr lang="en-US" dirty="0"/>
-          </a:p>
-          <a:p>
-            <a:pPr marL="0" indent="0">
-              <a:buNone/>
-            </a:pPr>
-            <a:r>
-              <a:rPr lang="en-US" dirty="0"/>
-              <a:t>Alle </a:t>
-            </a:r>
-            <a:r>
-              <a:rPr lang="en-US" dirty="0" err="1"/>
-              <a:t>teamleden</a:t>
-            </a:r>
-            <a:r>
-              <a:rPr lang="en-US" dirty="0"/>
-              <a:t> </a:t>
-            </a:r>
-            <a:r>
-              <a:rPr lang="en-US" dirty="0" err="1"/>
-              <a:t>maken</a:t>
-            </a:r>
-            <a:r>
-              <a:rPr lang="en-US" dirty="0"/>
-              <a:t> in de index.html in de </a:t>
-            </a:r>
-            <a:r>
-              <a:rPr lang="en-US" dirty="0" err="1"/>
-              <a:t>sectie</a:t>
-            </a:r>
-            <a:r>
-              <a:rPr lang="en-US" dirty="0"/>
-              <a:t> </a:t>
-            </a:r>
-            <a:r>
-              <a:rPr lang="en-US" b="1" dirty="0">
-                <a:latin typeface="Courier New" panose="02070309020205020404" pitchFamily="49" charset="0"/>
-                <a:cs typeface="Courier New" panose="02070309020205020404" pitchFamily="49" charset="0"/>
-              </a:rPr>
-              <a:t>&lt;main&gt; &lt;/main&gt; </a:t>
-            </a:r>
-            <a:r>
-              <a:rPr lang="en-US" dirty="0" err="1"/>
-              <a:t>een</a:t>
-            </a:r>
-            <a:r>
-              <a:rPr lang="en-US" dirty="0"/>
-              <a:t> </a:t>
-            </a:r>
-            <a:r>
-              <a:rPr lang="en-US" dirty="0" err="1"/>
-              <a:t>blok</a:t>
-            </a:r>
-            <a:r>
-              <a:rPr lang="en-US" dirty="0"/>
-              <a:t> </a:t>
-            </a:r>
-            <a:r>
-              <a:rPr lang="en-US" b="1" dirty="0">
-                <a:latin typeface="Courier New" panose="02070309020205020404" pitchFamily="49" charset="0"/>
-                <a:cs typeface="Courier New" panose="02070309020205020404" pitchFamily="49" charset="0"/>
-              </a:rPr>
-              <a:t>&lt;article id=“naam”&gt;&lt;/article&gt; </a:t>
-            </a:r>
-            <a:r>
-              <a:rPr lang="en-US" dirty="0"/>
-              <a:t>over </a:t>
-            </a:r>
-            <a:r>
-              <a:rPr lang="en-US" dirty="0" err="1"/>
-              <a:t>zichzelf</a:t>
-            </a:r>
-            <a:r>
-              <a:rPr lang="en-US" dirty="0"/>
-              <a:t>. </a:t>
-            </a:r>
-          </a:p>
-          <a:p>
-            <a:pPr marL="0" indent="0">
-              <a:buNone/>
-            </a:pPr>
-            <a:br>
-              <a:rPr lang="en-US" dirty="0"/>
-            </a:br>
-            <a:r>
-              <a:rPr lang="en-US" dirty="0" err="1"/>
-              <a:t>Iedereen</a:t>
-            </a:r>
-            <a:r>
-              <a:rPr lang="en-US" dirty="0"/>
-              <a:t> mag </a:t>
-            </a:r>
-            <a:r>
-              <a:rPr lang="en-US" dirty="0" err="1"/>
-              <a:t>zelf</a:t>
-            </a:r>
-            <a:r>
-              <a:rPr lang="en-US" dirty="0"/>
-              <a:t> </a:t>
-            </a:r>
-            <a:r>
-              <a:rPr lang="en-US" dirty="0" err="1"/>
-              <a:t>weten</a:t>
-            </a:r>
-            <a:r>
-              <a:rPr lang="en-US" dirty="0"/>
-              <a:t> </a:t>
-            </a:r>
-            <a:r>
-              <a:rPr lang="en-US" dirty="0" err="1"/>
-              <a:t>welke</a:t>
-            </a:r>
-            <a:r>
-              <a:rPr lang="en-US" dirty="0"/>
-              <a:t> </a:t>
-            </a:r>
-            <a:r>
-              <a:rPr lang="en-US" dirty="0" err="1"/>
-              <a:t>inhoud</a:t>
-            </a:r>
-            <a:r>
-              <a:rPr lang="en-US" dirty="0"/>
-              <a:t>: </a:t>
-            </a:r>
-            <a:r>
-              <a:rPr lang="en-US" dirty="0" err="1"/>
-              <a:t>favoriete</a:t>
-            </a:r>
-            <a:r>
-              <a:rPr lang="en-US" dirty="0"/>
-              <a:t> game, favorite </a:t>
-            </a:r>
-            <a:r>
-              <a:rPr lang="en-US" dirty="0" err="1"/>
-              <a:t>popgroep</a:t>
-            </a:r>
-            <a:r>
-              <a:rPr lang="en-US" dirty="0"/>
-              <a:t>, </a:t>
-            </a:r>
-            <a:r>
-              <a:rPr lang="en-US" dirty="0" err="1"/>
-              <a:t>favoriete</a:t>
-            </a:r>
-            <a:r>
-              <a:rPr lang="en-US" dirty="0"/>
-              <a:t> </a:t>
-            </a:r>
-            <a:r>
-              <a:rPr lang="en-US" dirty="0" err="1"/>
-              <a:t>kleur</a:t>
-            </a:r>
-            <a:r>
-              <a:rPr lang="en-US" dirty="0"/>
-              <a:t> </a:t>
-            </a:r>
-            <a:r>
-              <a:rPr lang="en-US" dirty="0" err="1"/>
-              <a:t>enz</a:t>
-            </a:r>
-            <a:r>
-              <a:rPr lang="en-US" dirty="0"/>
-              <a:t>. Het </a:t>
-            </a:r>
-            <a:r>
-              <a:rPr lang="en-US" dirty="0" err="1"/>
-              <a:t>kan</a:t>
-            </a:r>
-            <a:r>
-              <a:rPr lang="en-US" dirty="0"/>
-              <a:t> </a:t>
-            </a:r>
-            <a:r>
-              <a:rPr lang="en-US" dirty="0" err="1"/>
-              <a:t>een</a:t>
-            </a:r>
-            <a:r>
-              <a:rPr lang="en-US" dirty="0"/>
-              <a:t> </a:t>
-            </a:r>
-            <a:r>
-              <a:rPr lang="en-US" dirty="0" err="1"/>
-              <a:t>opsomming</a:t>
-            </a:r>
-            <a:r>
-              <a:rPr lang="en-US" dirty="0"/>
-              <a:t> </a:t>
-            </a:r>
-            <a:r>
-              <a:rPr lang="en-US" dirty="0" err="1"/>
-              <a:t>zijn</a:t>
-            </a:r>
-            <a:r>
-              <a:rPr lang="en-US" dirty="0"/>
-              <a:t>, het </a:t>
-            </a:r>
-            <a:r>
-              <a:rPr lang="en-US" dirty="0" err="1"/>
-              <a:t>kunnen</a:t>
-            </a:r>
-            <a:r>
-              <a:rPr lang="en-US" dirty="0"/>
-              <a:t> </a:t>
-            </a:r>
-            <a:r>
-              <a:rPr lang="en-US" dirty="0" err="1"/>
-              <a:t>ook</a:t>
-            </a:r>
-            <a:r>
-              <a:rPr lang="en-US" dirty="0"/>
-              <a:t> </a:t>
-            </a:r>
-            <a:r>
-              <a:rPr lang="en-US" dirty="0" err="1"/>
-              <a:t>afbeeldingen</a:t>
-            </a:r>
-            <a:r>
-              <a:rPr lang="en-US" dirty="0"/>
-              <a:t> </a:t>
-            </a:r>
-            <a:r>
-              <a:rPr lang="en-US" dirty="0" err="1"/>
-              <a:t>zijn</a:t>
-            </a:r>
-            <a:r>
-              <a:rPr lang="en-US" dirty="0"/>
-              <a:t> (</a:t>
-            </a:r>
-            <a:r>
-              <a:rPr lang="en-US" dirty="0" err="1"/>
-              <a:t>liever</a:t>
-            </a:r>
-            <a:r>
-              <a:rPr lang="en-US" dirty="0"/>
-              <a:t> </a:t>
-            </a:r>
-            <a:r>
-              <a:rPr lang="en-US" dirty="0" err="1"/>
-              <a:t>geen</a:t>
-            </a:r>
-            <a:r>
-              <a:rPr lang="en-US" dirty="0"/>
-              <a:t> </a:t>
-            </a:r>
-            <a:r>
-              <a:rPr lang="en-US" dirty="0" err="1"/>
-              <a:t>adresgegevens</a:t>
-            </a:r>
-            <a:r>
-              <a:rPr lang="en-US" dirty="0"/>
-              <a:t> of </a:t>
-            </a:r>
-            <a:r>
-              <a:rPr lang="en-US" dirty="0" err="1"/>
-              <a:t>foto</a:t>
-            </a:r>
-            <a:r>
-              <a:rPr lang="en-US" dirty="0"/>
-              <a:t> van </a:t>
-            </a:r>
-            <a:r>
-              <a:rPr lang="en-US" dirty="0" err="1"/>
-              <a:t>jezelf</a:t>
-            </a:r>
-            <a:r>
-              <a:rPr lang="en-US" dirty="0"/>
-              <a:t> </a:t>
-            </a:r>
-            <a:r>
-              <a:rPr lang="en-US" dirty="0" err="1"/>
-              <a:t>plaatsen</a:t>
-            </a:r>
-            <a:r>
-              <a:rPr lang="en-US" dirty="0"/>
-              <a:t>). Pas </a:t>
-            </a:r>
-            <a:r>
-              <a:rPr lang="en-US" dirty="0" err="1"/>
-              <a:t>eventueel</a:t>
-            </a:r>
-            <a:r>
-              <a:rPr lang="en-US" dirty="0"/>
-              <a:t> de </a:t>
-            </a:r>
-            <a:r>
-              <a:rPr lang="en-US" b="1" dirty="0">
-                <a:latin typeface="Courier New" panose="02070309020205020404" pitchFamily="49" charset="0"/>
-                <a:cs typeface="Courier New" panose="02070309020205020404" pitchFamily="49" charset="0"/>
-              </a:rPr>
-              <a:t>style.css </a:t>
-            </a:r>
-            <a:r>
-              <a:rPr lang="en-US" dirty="0" err="1"/>
-              <a:t>aan</a:t>
-            </a:r>
             <a:endParaRPr lang="en-US" dirty="0"/>
           </a:p>
         </p:txBody>
@@ -6539,6 +6764,515 @@
 </file>
 
 <file path=ppt/slides/slide8.xml><?xml version="1.0" encoding="utf-8"?>
+<p:sld xmlns:a="http://schemas.openxmlformats.org/drawingml/2006/main" xmlns:r="http://schemas.openxmlformats.org/officeDocument/2006/relationships" xmlns:p="http://schemas.openxmlformats.org/presentationml/2006/main">
+  <p:cSld>
+    <p:spTree>
+      <p:nvGrpSpPr>
+        <p:cNvPr id="1" name="">
+          <a:extLst>
+            <a:ext uri="{FF2B5EF4-FFF2-40B4-BE49-F238E27FC236}">
+              <a16:creationId xmlns:a16="http://schemas.microsoft.com/office/drawing/2014/main" id="{F02259BE-8323-2076-F132-2F41F8379FF1}"/>
+            </a:ext>
+          </a:extLst>
+        </p:cNvPr>
+        <p:cNvGrpSpPr/>
+        <p:nvPr/>
+      </p:nvGrpSpPr>
+      <p:grpSpPr>
+        <a:xfrm>
+          <a:off x="0" y="0"/>
+          <a:ext cx="0" cy="0"/>
+          <a:chOff x="0" y="0"/>
+          <a:chExt cx="0" cy="0"/>
+        </a:xfrm>
+      </p:grpSpPr>
+      <p:sp>
+        <p:nvSpPr>
+          <p:cNvPr id="2" name="Title 1">
+            <a:extLst>
+              <a:ext uri="{FF2B5EF4-FFF2-40B4-BE49-F238E27FC236}">
+                <a16:creationId xmlns:a16="http://schemas.microsoft.com/office/drawing/2014/main" id="{8ABE6E67-DAAC-3396-68BD-FF552BC9694A}"/>
+              </a:ext>
+            </a:extLst>
+          </p:cNvPr>
+          <p:cNvSpPr>
+            <a:spLocks noGrp="1"/>
+          </p:cNvSpPr>
+          <p:nvPr>
+            <p:ph type="title"/>
+          </p:nvPr>
+        </p:nvSpPr>
+        <p:spPr/>
+        <p:txBody>
+          <a:bodyPr/>
+          <a:lstStyle/>
+          <a:p>
+            <a:r>
+              <a:rPr lang="en-US" dirty="0"/>
+              <a:t>De </a:t>
+            </a:r>
+            <a:r>
+              <a:rPr lang="en-US" dirty="0" err="1"/>
+              <a:t>opdracht</a:t>
+            </a:r>
+            <a:r>
+              <a:rPr lang="en-US" dirty="0"/>
+              <a:t> (</a:t>
+            </a:r>
+            <a:r>
+              <a:rPr lang="en-US" dirty="0" err="1"/>
+              <a:t>vervolg</a:t>
+            </a:r>
+            <a:r>
+              <a:rPr lang="en-US" dirty="0"/>
+              <a:t>)</a:t>
+            </a:r>
+            <a:endParaRPr lang="nl-NL" dirty="0"/>
+          </a:p>
+        </p:txBody>
+      </p:sp>
+      <p:sp>
+        <p:nvSpPr>
+          <p:cNvPr id="4" name="Content Placeholder 3">
+            <a:extLst>
+              <a:ext uri="{FF2B5EF4-FFF2-40B4-BE49-F238E27FC236}">
+                <a16:creationId xmlns:a16="http://schemas.microsoft.com/office/drawing/2014/main" id="{8CD00DD8-A123-7E36-FDEE-BBC1ADAD4F42}"/>
+              </a:ext>
+            </a:extLst>
+          </p:cNvPr>
+          <p:cNvSpPr>
+            <a:spLocks noGrp="1"/>
+          </p:cNvSpPr>
+          <p:nvPr>
+            <p:ph sz="half" idx="1"/>
+          </p:nvPr>
+        </p:nvSpPr>
+        <p:spPr>
+          <a:xfrm>
+            <a:off x="838199" y="1825625"/>
+            <a:ext cx="11269718" cy="4922016"/>
+          </a:xfrm>
+        </p:spPr>
+        <p:txBody>
+          <a:bodyPr>
+            <a:normAutofit/>
+          </a:bodyPr>
+          <a:lstStyle/>
+          <a:p>
+            <a:pPr marL="0" indent="0">
+              <a:buNone/>
+            </a:pPr>
+            <a:r>
+              <a:rPr lang="en-US" dirty="0"/>
+              <a:t>Alle </a:t>
+            </a:r>
+            <a:r>
+              <a:rPr lang="en-US" dirty="0" err="1"/>
+              <a:t>teamleden</a:t>
+            </a:r>
+            <a:r>
+              <a:rPr lang="en-US" dirty="0"/>
+              <a:t>:</a:t>
+            </a:r>
+          </a:p>
+          <a:p>
+            <a:pPr marL="514350" indent="-514350">
+              <a:buFont typeface="+mj-lt"/>
+              <a:buAutoNum type="arabicPeriod"/>
+            </a:pPr>
+            <a:r>
+              <a:rPr lang="en-US" dirty="0" err="1"/>
+              <a:t>Maken</a:t>
+            </a:r>
+            <a:r>
+              <a:rPr lang="en-US" dirty="0"/>
+              <a:t> in de</a:t>
+            </a:r>
+            <a:r>
+              <a:rPr lang="en-US" b="1" dirty="0"/>
+              <a:t> </a:t>
+            </a:r>
+            <a:r>
+              <a:rPr lang="en-US" b="1" dirty="0" err="1"/>
+              <a:t>index.html</a:t>
+            </a:r>
+            <a:r>
+              <a:rPr lang="en-US" b="1" dirty="0"/>
+              <a:t> </a:t>
+            </a:r>
+            <a:r>
+              <a:rPr lang="en-US" dirty="0" err="1"/>
+              <a:t>binnen</a:t>
+            </a:r>
+            <a:r>
+              <a:rPr lang="en-US" dirty="0"/>
+              <a:t> de </a:t>
+            </a:r>
+            <a:r>
+              <a:rPr lang="en-US" dirty="0" err="1"/>
+              <a:t>sectie</a:t>
+            </a:r>
+            <a:r>
+              <a:rPr lang="en-US" dirty="0"/>
+              <a:t>: </a:t>
+            </a:r>
+            <a:r>
+              <a:rPr lang="en-US" b="1" dirty="0">
+                <a:latin typeface="Courier New" panose="02070309020205020404" pitchFamily="49" charset="0"/>
+                <a:cs typeface="Courier New" panose="02070309020205020404" pitchFamily="49" charset="0"/>
+              </a:rPr>
+              <a:t>&lt;main&gt; &lt;/main&gt;</a:t>
+            </a:r>
+            <a:br>
+              <a:rPr lang="en-US" b="1" dirty="0">
+                <a:latin typeface="Courier New" panose="02070309020205020404" pitchFamily="49" charset="0"/>
+                <a:cs typeface="Courier New" panose="02070309020205020404" pitchFamily="49" charset="0"/>
+              </a:rPr>
+            </a:br>
+            <a:r>
+              <a:rPr lang="en-US" dirty="0" err="1"/>
+              <a:t>een</a:t>
+            </a:r>
+            <a:r>
+              <a:rPr lang="en-US" dirty="0"/>
+              <a:t> </a:t>
+            </a:r>
+            <a:r>
+              <a:rPr lang="en-US" dirty="0" err="1"/>
+              <a:t>blok</a:t>
+            </a:r>
+            <a:r>
+              <a:rPr lang="en-US" dirty="0"/>
+              <a:t>: </a:t>
+            </a:r>
+            <a:r>
+              <a:rPr lang="en-US" b="1" dirty="0">
+                <a:latin typeface="Courier New" panose="02070309020205020404" pitchFamily="49" charset="0"/>
+                <a:cs typeface="Courier New" panose="02070309020205020404" pitchFamily="49" charset="0"/>
+              </a:rPr>
+              <a:t>&lt;article id="naam"&gt;&lt;/article&gt;</a:t>
+            </a:r>
+          </a:p>
+          <a:p>
+            <a:pPr marL="514350" indent="-514350">
+              <a:buFont typeface="+mj-lt"/>
+              <a:buAutoNum type="arabicPeriod"/>
+            </a:pPr>
+            <a:r>
+              <a:rPr lang="en-US" dirty="0" err="1"/>
+              <a:t>Plaats</a:t>
+            </a:r>
+            <a:r>
+              <a:rPr lang="en-US" dirty="0"/>
+              <a:t> </a:t>
+            </a:r>
+            <a:r>
+              <a:rPr lang="en-US" dirty="0" err="1"/>
+              <a:t>binnen</a:t>
+            </a:r>
+            <a:r>
+              <a:rPr lang="en-US" dirty="0"/>
+              <a:t> </a:t>
+            </a:r>
+            <a:r>
+              <a:rPr lang="en-US" dirty="0" err="1"/>
+              <a:t>dit</a:t>
+            </a:r>
+            <a:r>
+              <a:rPr lang="en-US" dirty="0"/>
+              <a:t> blog </a:t>
+            </a:r>
+            <a:r>
+              <a:rPr lang="en-US" dirty="0" err="1"/>
+              <a:t>iets</a:t>
+            </a:r>
+            <a:r>
+              <a:rPr lang="en-US" dirty="0"/>
+              <a:t> over </a:t>
+            </a:r>
+            <a:r>
+              <a:rPr lang="en-US" dirty="0" err="1"/>
+              <a:t>jezelf</a:t>
+            </a:r>
+            <a:r>
+              <a:rPr lang="en-US" dirty="0"/>
+              <a:t>.</a:t>
+            </a:r>
+            <a:br>
+              <a:rPr lang="en-US" dirty="0"/>
+            </a:br>
+            <a:r>
+              <a:rPr lang="en-US" dirty="0" err="1"/>
+              <a:t>Iedereen</a:t>
+            </a:r>
+            <a:r>
+              <a:rPr lang="en-US" dirty="0"/>
+              <a:t> mag </a:t>
+            </a:r>
+            <a:r>
+              <a:rPr lang="en-US" dirty="0" err="1"/>
+              <a:t>zelf</a:t>
+            </a:r>
+            <a:r>
+              <a:rPr lang="en-US" dirty="0"/>
+              <a:t> </a:t>
+            </a:r>
+            <a:r>
+              <a:rPr lang="en-US" dirty="0" err="1"/>
+              <a:t>weten</a:t>
+            </a:r>
+            <a:r>
+              <a:rPr lang="en-US" dirty="0"/>
+              <a:t> </a:t>
+            </a:r>
+            <a:r>
+              <a:rPr lang="en-US" dirty="0" err="1"/>
+              <a:t>welke</a:t>
+            </a:r>
+            <a:r>
+              <a:rPr lang="en-US" dirty="0"/>
+              <a:t> </a:t>
+            </a:r>
+            <a:r>
+              <a:rPr lang="en-US" dirty="0" err="1"/>
+              <a:t>inhoud</a:t>
+            </a:r>
+            <a:r>
+              <a:rPr lang="en-US" dirty="0"/>
+              <a:t>: </a:t>
+            </a:r>
+            <a:r>
+              <a:rPr lang="en-US" dirty="0" err="1"/>
+              <a:t>favoriete</a:t>
+            </a:r>
+            <a:r>
+              <a:rPr lang="en-US" dirty="0"/>
+              <a:t> game, favorite </a:t>
+            </a:r>
+            <a:r>
+              <a:rPr lang="en-US" dirty="0" err="1"/>
+              <a:t>popgroep</a:t>
+            </a:r>
+            <a:r>
+              <a:rPr lang="en-US" dirty="0"/>
+              <a:t>, </a:t>
+            </a:r>
+            <a:r>
+              <a:rPr lang="en-US" dirty="0" err="1"/>
+              <a:t>favoriete</a:t>
+            </a:r>
+            <a:r>
+              <a:rPr lang="en-US" dirty="0"/>
+              <a:t> </a:t>
+            </a:r>
+            <a:r>
+              <a:rPr lang="en-US" dirty="0" err="1"/>
+              <a:t>kleur</a:t>
+            </a:r>
+            <a:r>
+              <a:rPr lang="en-US" dirty="0"/>
+              <a:t> </a:t>
+            </a:r>
+            <a:r>
+              <a:rPr lang="en-US" dirty="0" err="1"/>
+              <a:t>enz</a:t>
+            </a:r>
+            <a:r>
+              <a:rPr lang="en-US" dirty="0"/>
+              <a:t>. Het </a:t>
+            </a:r>
+            <a:r>
+              <a:rPr lang="en-US" dirty="0" err="1"/>
+              <a:t>kan</a:t>
+            </a:r>
+            <a:r>
+              <a:rPr lang="en-US" dirty="0"/>
+              <a:t> </a:t>
+            </a:r>
+            <a:r>
+              <a:rPr lang="en-US" dirty="0" err="1"/>
+              <a:t>een</a:t>
+            </a:r>
+            <a:r>
+              <a:rPr lang="en-US" dirty="0"/>
+              <a:t> </a:t>
+            </a:r>
+            <a:r>
+              <a:rPr lang="en-US" dirty="0" err="1"/>
+              <a:t>opsomming</a:t>
+            </a:r>
+            <a:r>
+              <a:rPr lang="en-US" dirty="0"/>
+              <a:t> </a:t>
+            </a:r>
+            <a:r>
+              <a:rPr lang="en-US" dirty="0" err="1"/>
+              <a:t>zijn</a:t>
+            </a:r>
+            <a:r>
+              <a:rPr lang="en-US" dirty="0"/>
+              <a:t>, </a:t>
+            </a:r>
+            <a:r>
+              <a:rPr lang="en-US" dirty="0" err="1"/>
+              <a:t>afbeeldingen</a:t>
+            </a:r>
+            <a:r>
+              <a:rPr lang="en-US" dirty="0"/>
+              <a:t> </a:t>
+            </a:r>
+            <a:r>
+              <a:rPr lang="en-US" dirty="0" err="1"/>
+              <a:t>kunnen</a:t>
+            </a:r>
+            <a:r>
+              <a:rPr lang="en-US" dirty="0"/>
+              <a:t> </a:t>
+            </a:r>
+            <a:r>
+              <a:rPr lang="en-US" dirty="0" err="1"/>
+              <a:t>ook</a:t>
+            </a:r>
+            <a:r>
+              <a:rPr lang="en-US" dirty="0"/>
+              <a:t>.</a:t>
+            </a:r>
+            <a:br>
+              <a:rPr lang="en-US" dirty="0"/>
+            </a:br>
+            <a:r>
+              <a:rPr lang="en-US" dirty="0"/>
+              <a:t>(</a:t>
+            </a:r>
+            <a:r>
+              <a:rPr lang="en-US" i="1" dirty="0" err="1"/>
+              <a:t>geen</a:t>
+            </a:r>
+            <a:r>
+              <a:rPr lang="en-US" i="1" dirty="0"/>
+              <a:t> </a:t>
+            </a:r>
+            <a:r>
+              <a:rPr lang="en-US" i="1" dirty="0" err="1"/>
+              <a:t>adresgegevens</a:t>
+            </a:r>
+            <a:r>
+              <a:rPr lang="en-US" i="1" dirty="0"/>
+              <a:t> of </a:t>
+            </a:r>
+            <a:r>
+              <a:rPr lang="en-US" i="1" dirty="0" err="1"/>
+              <a:t>foto</a:t>
+            </a:r>
+            <a:r>
+              <a:rPr lang="en-US" i="1" dirty="0"/>
+              <a:t> van </a:t>
+            </a:r>
+            <a:r>
+              <a:rPr lang="en-US" i="1" dirty="0" err="1"/>
+              <a:t>jezelf</a:t>
+            </a:r>
+            <a:r>
+              <a:rPr lang="en-US" i="1" dirty="0"/>
+              <a:t> </a:t>
+            </a:r>
+            <a:r>
+              <a:rPr lang="en-US" i="1" dirty="0" err="1"/>
+              <a:t>plaatsen</a:t>
+            </a:r>
+            <a:r>
+              <a:rPr lang="en-US" dirty="0"/>
+              <a:t>).</a:t>
+            </a:r>
+          </a:p>
+          <a:p>
+            <a:pPr marL="514350" indent="-514350">
+              <a:buFont typeface="+mj-lt"/>
+              <a:buAutoNum type="arabicPeriod"/>
+            </a:pPr>
+            <a:r>
+              <a:rPr lang="en-US" dirty="0"/>
+              <a:t>Pas de </a:t>
+            </a:r>
+            <a:r>
+              <a:rPr lang="en-US" b="1" dirty="0" err="1">
+                <a:latin typeface="Courier New" panose="02070309020205020404" pitchFamily="49" charset="0"/>
+                <a:cs typeface="Courier New" panose="02070309020205020404" pitchFamily="49" charset="0"/>
+              </a:rPr>
+              <a:t>style.css</a:t>
+            </a:r>
+            <a:r>
+              <a:rPr lang="en-US" b="1" dirty="0">
+                <a:latin typeface="Courier New" panose="02070309020205020404" pitchFamily="49" charset="0"/>
+                <a:cs typeface="Courier New" panose="02070309020205020404" pitchFamily="49" charset="0"/>
+              </a:rPr>
+              <a:t> </a:t>
+            </a:r>
+            <a:r>
+              <a:rPr lang="en-US" dirty="0" err="1"/>
+              <a:t>aan</a:t>
+            </a:r>
+            <a:r>
+              <a:rPr lang="en-US" dirty="0"/>
+              <a:t> </a:t>
+            </a:r>
+            <a:r>
+              <a:rPr lang="en-US" dirty="0" err="1"/>
+              <a:t>zodat</a:t>
+            </a:r>
+            <a:r>
+              <a:rPr lang="en-US" dirty="0"/>
+              <a:t> de </a:t>
+            </a:r>
+            <a:r>
+              <a:rPr lang="en-US" dirty="0" err="1"/>
+              <a:t>stijl</a:t>
+            </a:r>
+            <a:r>
+              <a:rPr lang="en-US" dirty="0"/>
+              <a:t> van </a:t>
+            </a:r>
+            <a:r>
+              <a:rPr lang="en-US" dirty="0" err="1"/>
+              <a:t>jouw</a:t>
+            </a:r>
+            <a:r>
+              <a:rPr lang="en-US" dirty="0"/>
+              <a:t> </a:t>
+            </a:r>
+            <a:r>
+              <a:rPr lang="en-US" dirty="0" err="1"/>
+              <a:t>blok</a:t>
+            </a:r>
+            <a:r>
+              <a:rPr lang="en-US" dirty="0"/>
+              <a:t> </a:t>
+            </a:r>
+            <a:r>
+              <a:rPr lang="en-US" dirty="0" err="1"/>
+              <a:t>uniek</a:t>
+            </a:r>
+            <a:r>
+              <a:rPr lang="en-US" dirty="0"/>
+              <a:t> is.</a:t>
+            </a:r>
+          </a:p>
+        </p:txBody>
+      </p:sp>
+    </p:spTree>
+    <p:extLst>
+      <p:ext uri="{BB962C8B-B14F-4D97-AF65-F5344CB8AC3E}">
+        <p14:creationId xmlns:p14="http://schemas.microsoft.com/office/powerpoint/2010/main" val="1033065971"/>
+      </p:ext>
+    </p:extLst>
+  </p:cSld>
+  <p:clrMapOvr>
+    <a:masterClrMapping/>
+  </p:clrMapOvr>
+</p:sld>
+</file>
+
+<file path=ppt/slides/slide9.xml><?xml version="1.0" encoding="utf-8"?>
 <p:sld xmlns:a="http://schemas.openxmlformats.org/drawingml/2006/main" xmlns:r="http://schemas.openxmlformats.org/officeDocument/2006/relationships" xmlns:p="http://schemas.openxmlformats.org/presentationml/2006/main">
   <p:cSld>
     <p:spTree>
@@ -6698,7 +7432,7 @@
             </a:pPr>
             <a:r>
               <a:rPr lang="en-US" dirty="0"/>
-              <a:t>Upload de eigen branch </a:t>
+              <a:t>Push de eigen branch </a:t>
             </a:r>
             <a:r>
               <a:rPr lang="en-US" dirty="0" err="1"/>
@@ -6730,336 +7464,6 @@
     <p:extLst>
       <p:ext uri="{BB962C8B-B14F-4D97-AF65-F5344CB8AC3E}">
         <p14:creationId xmlns:p14="http://schemas.microsoft.com/office/powerpoint/2010/main" val="1763551849"/>
-      </p:ext>
-    </p:extLst>
-  </p:cSld>
-  <p:clrMapOvr>
-    <a:masterClrMapping/>
-  </p:clrMapOvr>
-</p:sld>
-</file>
-
-<file path=ppt/slides/slide9.xml><?xml version="1.0" encoding="utf-8"?>
-<p:sld xmlns:a="http://schemas.openxmlformats.org/drawingml/2006/main" xmlns:r="http://schemas.openxmlformats.org/officeDocument/2006/relationships" xmlns:p="http://schemas.openxmlformats.org/presentationml/2006/main">
-  <p:cSld>
-    <p:spTree>
-      <p:nvGrpSpPr>
-        <p:cNvPr id="1" name="">
-          <a:extLst>
-            <a:ext uri="{FF2B5EF4-FFF2-40B4-BE49-F238E27FC236}">
-              <a16:creationId xmlns:a16="http://schemas.microsoft.com/office/drawing/2014/main" id="{B4D6134D-60AC-6763-E0D9-C786A98F3931}"/>
-            </a:ext>
-          </a:extLst>
-        </p:cNvPr>
-        <p:cNvGrpSpPr/>
-        <p:nvPr/>
-      </p:nvGrpSpPr>
-      <p:grpSpPr>
-        <a:xfrm>
-          <a:off x="0" y="0"/>
-          <a:ext cx="0" cy="0"/>
-          <a:chOff x="0" y="0"/>
-          <a:chExt cx="0" cy="0"/>
-        </a:xfrm>
-      </p:grpSpPr>
-      <p:sp>
-        <p:nvSpPr>
-          <p:cNvPr id="2" name="Title 1">
-            <a:extLst>
-              <a:ext uri="{FF2B5EF4-FFF2-40B4-BE49-F238E27FC236}">
-                <a16:creationId xmlns:a16="http://schemas.microsoft.com/office/drawing/2014/main" id="{0B242A5E-1B4C-445F-623E-9C1549B89136}"/>
-              </a:ext>
-            </a:extLst>
-          </p:cNvPr>
-          <p:cNvSpPr>
-            <a:spLocks noGrp="1"/>
-          </p:cNvSpPr>
-          <p:nvPr>
-            <p:ph type="title"/>
-          </p:nvPr>
-        </p:nvSpPr>
-        <p:spPr/>
-        <p:txBody>
-          <a:bodyPr/>
-          <a:lstStyle/>
-          <a:p>
-            <a:r>
-              <a:rPr lang="en-US" dirty="0"/>
-              <a:t>De </a:t>
-            </a:r>
-            <a:r>
-              <a:rPr lang="en-US" dirty="0" err="1"/>
-              <a:t>opdracht</a:t>
-            </a:r>
-            <a:r>
-              <a:rPr lang="en-US" dirty="0"/>
-              <a:t> (</a:t>
-            </a:r>
-            <a:r>
-              <a:rPr lang="en-US" dirty="0" err="1"/>
-              <a:t>vervolg</a:t>
-            </a:r>
-            <a:r>
-              <a:rPr lang="en-US" dirty="0"/>
-              <a:t>)</a:t>
-            </a:r>
-            <a:endParaRPr lang="nl-NL" dirty="0"/>
-          </a:p>
-        </p:txBody>
-      </p:sp>
-      <p:sp>
-        <p:nvSpPr>
-          <p:cNvPr id="4" name="Content Placeholder 3">
-            <a:extLst>
-              <a:ext uri="{FF2B5EF4-FFF2-40B4-BE49-F238E27FC236}">
-                <a16:creationId xmlns:a16="http://schemas.microsoft.com/office/drawing/2014/main" id="{E5E65AD5-67BA-47E4-4223-2A714F3F5680}"/>
-              </a:ext>
-            </a:extLst>
-          </p:cNvPr>
-          <p:cNvSpPr>
-            <a:spLocks noGrp="1"/>
-          </p:cNvSpPr>
-          <p:nvPr>
-            <p:ph sz="half" idx="1"/>
-          </p:nvPr>
-        </p:nvSpPr>
-        <p:spPr>
-          <a:xfrm>
-            <a:off x="838200" y="1825625"/>
-            <a:ext cx="9152106" cy="4667250"/>
-          </a:xfrm>
-        </p:spPr>
-        <p:txBody>
-          <a:bodyPr>
-            <a:normAutofit lnSpcReduction="10000"/>
-          </a:bodyPr>
-          <a:lstStyle/>
-          <a:p>
-            <a:pPr marL="0" indent="0">
-              <a:buNone/>
-            </a:pPr>
-            <a:r>
-              <a:rPr lang="en-US" dirty="0" err="1"/>
-              <a:t>Een</a:t>
-            </a:r>
-            <a:r>
-              <a:rPr lang="en-US" dirty="0"/>
-              <a:t> van de </a:t>
-            </a:r>
-            <a:r>
-              <a:rPr lang="en-US" dirty="0" err="1"/>
-              <a:t>teamleden</a:t>
-            </a:r>
-            <a:r>
-              <a:rPr lang="en-US" dirty="0"/>
-              <a:t>:</a:t>
-            </a:r>
-          </a:p>
-          <a:p>
-            <a:pPr marL="514350" indent="-514350">
-              <a:buFont typeface="+mj-lt"/>
-              <a:buAutoNum type="arabicPeriod"/>
-            </a:pPr>
-            <a:r>
-              <a:rPr lang="en-US" dirty="0"/>
-              <a:t>Pull alle branches </a:t>
-            </a:r>
-            <a:r>
-              <a:rPr lang="en-US" dirty="0" err="1"/>
-              <a:t>naar</a:t>
-            </a:r>
-            <a:r>
-              <a:rPr lang="en-US" dirty="0"/>
-              <a:t> </a:t>
-            </a:r>
-            <a:r>
-              <a:rPr lang="en-US" dirty="0" err="1"/>
-              <a:t>jouw</a:t>
-            </a:r>
-            <a:r>
-              <a:rPr lang="en-US" dirty="0"/>
-              <a:t> eigen </a:t>
-            </a:r>
-            <a:r>
-              <a:rPr lang="en-US" dirty="0" err="1"/>
-              <a:t>werkdirectory</a:t>
-            </a:r>
-            <a:endParaRPr lang="en-US" dirty="0"/>
-          </a:p>
-          <a:p>
-            <a:pPr marL="514350" indent="-514350">
-              <a:buFont typeface="+mj-lt"/>
-              <a:buAutoNum type="arabicPeriod"/>
-            </a:pPr>
-            <a:r>
-              <a:rPr lang="en-US" b="1" dirty="0">
-                <a:latin typeface="Courier New" panose="02070309020205020404" pitchFamily="49" charset="0"/>
-                <a:cs typeface="Courier New" panose="02070309020205020404" pitchFamily="49" charset="0"/>
-              </a:rPr>
-              <a:t>Check de branch main </a:t>
-            </a:r>
-            <a:r>
-              <a:rPr lang="en-US" b="1" dirty="0" err="1">
-                <a:latin typeface="Courier New" panose="02070309020205020404" pitchFamily="49" charset="0"/>
-                <a:cs typeface="Courier New" panose="02070309020205020404" pitchFamily="49" charset="0"/>
-              </a:rPr>
-              <a:t>uit</a:t>
-            </a:r>
-            <a:endParaRPr lang="en-US" b="1" dirty="0">
-              <a:latin typeface="Courier New" panose="02070309020205020404" pitchFamily="49" charset="0"/>
-              <a:cs typeface="Courier New" panose="02070309020205020404" pitchFamily="49" charset="0"/>
-            </a:endParaRPr>
-          </a:p>
-          <a:p>
-            <a:pPr marL="514350" indent="-514350">
-              <a:buFont typeface="+mj-lt"/>
-              <a:buAutoNum type="arabicPeriod"/>
-            </a:pPr>
-            <a:r>
-              <a:rPr lang="en-US" dirty="0"/>
-              <a:t>Merge </a:t>
-            </a:r>
-            <a:r>
-              <a:rPr lang="en-US" dirty="0" err="1"/>
-              <a:t>een-voor-een</a:t>
-            </a:r>
-            <a:r>
-              <a:rPr lang="en-US" dirty="0"/>
-              <a:t> alle branches </a:t>
-            </a:r>
-            <a:r>
-              <a:rPr lang="en-US" dirty="0" err="1"/>
-              <a:t>naar</a:t>
-            </a:r>
-            <a:r>
-              <a:rPr lang="en-US" dirty="0"/>
-              <a:t> de main-branch</a:t>
-            </a:r>
-          </a:p>
-          <a:p>
-            <a:pPr marL="514350" indent="-514350">
-              <a:buFont typeface="+mj-lt"/>
-              <a:buAutoNum type="arabicPeriod"/>
-            </a:pPr>
-            <a:r>
-              <a:rPr lang="en-US" dirty="0" err="1"/>
-              <a:t>Plaats</a:t>
-            </a:r>
-            <a:r>
-              <a:rPr lang="en-US" dirty="0"/>
-              <a:t> het </a:t>
-            </a:r>
-            <a:r>
-              <a:rPr lang="en-US" dirty="0" err="1"/>
-              <a:t>eindproduct</a:t>
-            </a:r>
-            <a:r>
-              <a:rPr lang="en-US" dirty="0"/>
-              <a:t> op de ma-cloud van </a:t>
-            </a:r>
-            <a:r>
-              <a:rPr lang="en-US" dirty="0" err="1"/>
-              <a:t>een</a:t>
-            </a:r>
-            <a:r>
-              <a:rPr lang="en-US" dirty="0"/>
-              <a:t> van de </a:t>
-            </a:r>
-            <a:r>
-              <a:rPr lang="en-US" dirty="0" err="1"/>
-              <a:t>teamleden</a:t>
-            </a:r>
-            <a:r>
-              <a:rPr lang="en-US" dirty="0"/>
-              <a:t> </a:t>
-            </a:r>
-          </a:p>
-          <a:p>
-            <a:pPr marL="514350" indent="-514350">
-              <a:buFont typeface="+mj-lt"/>
-              <a:buAutoNum type="arabicPeriod"/>
-            </a:pPr>
-            <a:r>
-              <a:rPr lang="en-US" dirty="0"/>
-              <a:t>Maak in de README.md </a:t>
-            </a:r>
-            <a:r>
-              <a:rPr lang="en-US" dirty="0" err="1"/>
-              <a:t>een</a:t>
-            </a:r>
-            <a:r>
-              <a:rPr lang="en-US" dirty="0"/>
-              <a:t> </a:t>
-            </a:r>
-            <a:r>
-              <a:rPr lang="en-US" dirty="0" err="1"/>
-              <a:t>duidelijke</a:t>
-            </a:r>
-            <a:r>
-              <a:rPr lang="en-US" dirty="0"/>
-              <a:t> link </a:t>
-            </a:r>
-            <a:r>
-              <a:rPr lang="en-US" dirty="0" err="1"/>
-              <a:t>naar</a:t>
-            </a:r>
-            <a:r>
-              <a:rPr lang="en-US" dirty="0"/>
-              <a:t> </a:t>
-            </a:r>
-            <a:r>
-              <a:rPr lang="en-US" dirty="0" err="1"/>
-              <a:t>dit</a:t>
-            </a:r>
-            <a:r>
-              <a:rPr lang="en-US" dirty="0"/>
-              <a:t> </a:t>
-            </a:r>
-            <a:r>
-              <a:rPr lang="en-US" dirty="0" err="1"/>
-              <a:t>eindproduct</a:t>
-            </a:r>
-            <a:endParaRPr lang="en-US" dirty="0"/>
-          </a:p>
-          <a:p>
-            <a:pPr marL="514350" indent="-514350">
-              <a:buFont typeface="+mj-lt"/>
-              <a:buAutoNum type="arabicPeriod"/>
-            </a:pPr>
-            <a:r>
-              <a:rPr lang="en-US" dirty="0"/>
-              <a:t>Push het </a:t>
-            </a:r>
-            <a:r>
-              <a:rPr lang="en-US" dirty="0" err="1"/>
-              <a:t>eindproduct</a:t>
-            </a:r>
-            <a:r>
-              <a:rPr lang="en-US" dirty="0"/>
-              <a:t> </a:t>
-            </a:r>
-            <a:r>
-              <a:rPr lang="en-US" dirty="0" err="1"/>
-              <a:t>naar</a:t>
-            </a:r>
-            <a:r>
-              <a:rPr lang="en-US" dirty="0"/>
-              <a:t> de remote repository (branch main)</a:t>
-            </a:r>
-          </a:p>
-          <a:p>
-            <a:pPr marL="514350" indent="-514350">
-              <a:buFont typeface="+mj-lt"/>
-              <a:buAutoNum type="arabicPeriod"/>
-            </a:pPr>
-            <a:endParaRPr lang="en-US" dirty="0"/>
-          </a:p>
-        </p:txBody>
-      </p:sp>
-    </p:spTree>
-    <p:extLst>
-      <p:ext uri="{BB962C8B-B14F-4D97-AF65-F5344CB8AC3E}">
-        <p14:creationId xmlns:p14="http://schemas.microsoft.com/office/powerpoint/2010/main" val="4256530953"/>
       </p:ext>
     </p:extLst>
   </p:cSld>

</xml_diff>